<commit_message>
Moving Windows Virtual Desktop slide to presentation 2
</commit_message>
<xml_diff>
--- a/presentations/2 - Core Azure Services.pptx
+++ b/presentations/2 - Core Azure Services.pptx
@@ -5,7 +5,7 @@
     <p:sldMasterId id="2147483673" r:id="rId4"/>
   </p:sldMasterIdLst>
   <p:notesMasterIdLst>
-    <p:notesMasterId r:id="rId41"/>
+    <p:notesMasterId r:id="rId42"/>
   </p:notesMasterIdLst>
   <p:sldIdLst>
     <p:sldId id="257" r:id="rId5"/>
@@ -18,32 +18,33 @@
     <p:sldId id="273" r:id="rId12"/>
     <p:sldId id="274" r:id="rId13"/>
     <p:sldId id="303" r:id="rId14"/>
-    <p:sldId id="276" r:id="rId15"/>
-    <p:sldId id="275" r:id="rId16"/>
-    <p:sldId id="277" r:id="rId17"/>
-    <p:sldId id="278" r:id="rId18"/>
-    <p:sldId id="280" r:id="rId19"/>
-    <p:sldId id="306" r:id="rId20"/>
-    <p:sldId id="281" r:id="rId21"/>
-    <p:sldId id="282" r:id="rId22"/>
-    <p:sldId id="283" r:id="rId23"/>
-    <p:sldId id="284" r:id="rId24"/>
-    <p:sldId id="285" r:id="rId25"/>
-    <p:sldId id="286" r:id="rId26"/>
-    <p:sldId id="288" r:id="rId27"/>
-    <p:sldId id="289" r:id="rId28"/>
-    <p:sldId id="290" r:id="rId29"/>
-    <p:sldId id="287" r:id="rId30"/>
-    <p:sldId id="291" r:id="rId31"/>
-    <p:sldId id="292" r:id="rId32"/>
-    <p:sldId id="293" r:id="rId33"/>
-    <p:sldId id="294" r:id="rId34"/>
-    <p:sldId id="295" r:id="rId35"/>
-    <p:sldId id="296" r:id="rId36"/>
-    <p:sldId id="297" r:id="rId37"/>
-    <p:sldId id="298" r:id="rId38"/>
-    <p:sldId id="299" r:id="rId39"/>
-    <p:sldId id="300" r:id="rId40"/>
+    <p:sldId id="258" r:id="rId15"/>
+    <p:sldId id="276" r:id="rId16"/>
+    <p:sldId id="275" r:id="rId17"/>
+    <p:sldId id="277" r:id="rId18"/>
+    <p:sldId id="278" r:id="rId19"/>
+    <p:sldId id="280" r:id="rId20"/>
+    <p:sldId id="306" r:id="rId21"/>
+    <p:sldId id="281" r:id="rId22"/>
+    <p:sldId id="282" r:id="rId23"/>
+    <p:sldId id="283" r:id="rId24"/>
+    <p:sldId id="284" r:id="rId25"/>
+    <p:sldId id="285" r:id="rId26"/>
+    <p:sldId id="286" r:id="rId27"/>
+    <p:sldId id="288" r:id="rId28"/>
+    <p:sldId id="289" r:id="rId29"/>
+    <p:sldId id="290" r:id="rId30"/>
+    <p:sldId id="287" r:id="rId31"/>
+    <p:sldId id="291" r:id="rId32"/>
+    <p:sldId id="292" r:id="rId33"/>
+    <p:sldId id="293" r:id="rId34"/>
+    <p:sldId id="294" r:id="rId35"/>
+    <p:sldId id="295" r:id="rId36"/>
+    <p:sldId id="296" r:id="rId37"/>
+    <p:sldId id="297" r:id="rId38"/>
+    <p:sldId id="298" r:id="rId39"/>
+    <p:sldId id="299" r:id="rId40"/>
+    <p:sldId id="300" r:id="rId41"/>
   </p:sldIdLst>
   <p:sldSz cx="12192000" cy="6858000"/>
   <p:notesSz cx="6858000" cy="9144000"/>
@@ -232,7 +233,7 @@
           <a:p>
             <a:fld id="{4CE84C73-2057-46A6-AB4D-D04185F43FC1}" type="datetimeFigureOut">
               <a:rPr lang="pl-PL" smtClean="0"/>
-              <a:t>20.05.2021</a:t>
+              <a:t>07.06.2021</a:t>
             </a:fld>
             <a:endParaRPr lang="pl-PL"/>
           </a:p>
@@ -2605,7 +2606,7 @@
           <a:p>
             <a:fld id="{6E3D1C26-421B-4DE2-8E11-93CC1C2D7D9C}" type="slidenum">
               <a:rPr lang="pl-PL" smtClean="0"/>
-              <a:t>19</a:t>
+              <a:t>20</a:t>
             </a:fld>
             <a:endParaRPr lang="pl-PL"/>
           </a:p>
@@ -2719,7 +2720,7 @@
           <a:p>
             <a:fld id="{6E3D1C26-421B-4DE2-8E11-93CC1C2D7D9C}" type="slidenum">
               <a:rPr lang="pl-PL" smtClean="0"/>
-              <a:t>20</a:t>
+              <a:t>21</a:t>
             </a:fld>
             <a:endParaRPr lang="pl-PL"/>
           </a:p>
@@ -2852,7 +2853,7 @@
           <a:p>
             <a:fld id="{6E3D1C26-421B-4DE2-8E11-93CC1C2D7D9C}" type="slidenum">
               <a:rPr lang="pl-PL" smtClean="0"/>
-              <a:t>22</a:t>
+              <a:t>23</a:t>
             </a:fld>
             <a:endParaRPr lang="pl-PL"/>
           </a:p>
@@ -2946,7 +2947,7 @@
           <a:p>
             <a:fld id="{6E3D1C26-421B-4DE2-8E11-93CC1C2D7D9C}" type="slidenum">
               <a:rPr lang="pl-PL" smtClean="0"/>
-              <a:t>33</a:t>
+              <a:t>34</a:t>
             </a:fld>
             <a:endParaRPr lang="pl-PL"/>
           </a:p>
@@ -3434,7 +3435,7 @@
           <a:p>
             <a:fld id="{EA0C0817-A112-4847-8014-A94B7D2A4EA3}" type="datetime1">
               <a:rPr lang="en-US" smtClean="0"/>
-              <a:t>5/20/2021</a:t>
+              <a:t>6/7/2021</a:t>
             </a:fld>
             <a:endParaRPr lang="en-US" dirty="0"/>
           </a:p>
@@ -3636,7 +3637,7 @@
           <a:p>
             <a:fld id="{7332B432-ACDA-4023-A761-2BAB76577B62}" type="datetime1">
               <a:rPr lang="en-US" smtClean="0"/>
-              <a:t>5/20/2021</a:t>
+              <a:t>6/7/2021</a:t>
             </a:fld>
             <a:endParaRPr lang="en-US" dirty="0"/>
           </a:p>
@@ -4235,7 +4236,7 @@
           <a:p>
             <a:fld id="{D9C646AA-F36E-4540-911D-FFFC0A0EF24A}" type="datetime1">
               <a:rPr lang="en-US" smtClean="0"/>
-              <a:t>5/20/2021</a:t>
+              <a:t>6/7/2021</a:t>
             </a:fld>
             <a:endParaRPr lang="en-US" dirty="0"/>
           </a:p>
@@ -4555,7 +4556,7 @@
           <a:p>
             <a:fld id="{69186D26-FA5F-4637-B602-B7C2DC34CFD4}" type="datetime1">
               <a:rPr lang="en-US" smtClean="0"/>
-              <a:t>5/20/2021</a:t>
+              <a:t>6/7/2021</a:t>
             </a:fld>
             <a:endParaRPr lang="en-US" dirty="0"/>
           </a:p>
@@ -4992,7 +4993,7 @@
           <a:p>
             <a:fld id="{8A7F15D8-96D1-4781-BC50-CA8A088B2FE4}" type="datetime1">
               <a:rPr lang="en-US" smtClean="0"/>
-              <a:t>5/20/2021</a:t>
+              <a:t>6/7/2021</a:t>
             </a:fld>
             <a:endParaRPr lang="en-US" dirty="0"/>
           </a:p>
@@ -5110,7 +5111,7 @@
           <a:p>
             <a:fld id="{F9A96C99-B8F8-4528-BD05-0E16E943DC09}" type="datetime1">
               <a:rPr lang="en-US" smtClean="0"/>
-              <a:t>5/20/2021</a:t>
+              <a:t>6/7/2021</a:t>
             </a:fld>
             <a:endParaRPr lang="en-US" dirty="0"/>
           </a:p>
@@ -5205,7 +5206,7 @@
           <a:p>
             <a:fld id="{03636942-C211-4B28-8DBD-C953E00AF71B}" type="datetime1">
               <a:rPr lang="en-US" smtClean="0"/>
-              <a:t>5/20/2021</a:t>
+              <a:t>6/7/2021</a:t>
             </a:fld>
             <a:endParaRPr lang="en-US" dirty="0"/>
           </a:p>
@@ -5622,7 +5623,7 @@
           <a:p>
             <a:fld id="{7E8D12A6-918A-48BD-8CB9-CA713993B0EA}" type="datetime1">
               <a:rPr lang="en-US" smtClean="0"/>
-              <a:t>5/20/2021</a:t>
+              <a:t>6/7/2021</a:t>
             </a:fld>
             <a:endParaRPr lang="en-US" dirty="0"/>
           </a:p>
@@ -5884,7 +5885,7 @@
             <a:fld id="{E778CE86-875F-4587-BCF6-FA054AFC0D53}" type="datetime1">
               <a:rPr lang="en-US" smtClean="0"/>
               <a:pPr/>
-              <a:t>5/20/2021</a:t>
+              <a:t>6/7/2021</a:t>
             </a:fld>
             <a:endParaRPr lang="en-US" dirty="0"/>
           </a:p>
@@ -6400,7 +6401,7 @@
           <a:p>
             <a:fld id="{F6FA2B21-3FCD-4721-B95C-427943F61125}" type="datetime1">
               <a:rPr lang="en-US" smtClean="0"/>
-              <a:t>5/20/2021</a:t>
+              <a:t>6/7/2021</a:t>
             </a:fld>
             <a:endParaRPr lang="en-US" dirty="0"/>
           </a:p>
@@ -7430,6 +7431,312 @@
           <p:cNvPr id="2" name="Title 1">
             <a:extLst>
               <a:ext uri="{FF2B5EF4-FFF2-40B4-BE49-F238E27FC236}">
+                <a16:creationId xmlns:a16="http://schemas.microsoft.com/office/drawing/2014/main" id="{0682C838-98B0-49DB-8295-7C9C9A4F0329}"/>
+              </a:ext>
+            </a:extLst>
+          </p:cNvPr>
+          <p:cNvSpPr>
+            <a:spLocks noGrp="1"/>
+          </p:cNvSpPr>
+          <p:nvPr>
+            <p:ph type="title"/>
+          </p:nvPr>
+        </p:nvSpPr>
+        <p:spPr/>
+        <p:txBody>
+          <a:bodyPr/>
+          <a:lstStyle/>
+          <a:p>
+            <a:r>
+              <a:rPr lang="pl-PL" dirty="0"/>
+              <a:t>Windows Virtual Desktop</a:t>
+            </a:r>
+          </a:p>
+        </p:txBody>
+      </p:sp>
+      <p:sp>
+        <p:nvSpPr>
+          <p:cNvPr id="3" name="Content Placeholder 2">
+            <a:extLst>
+              <a:ext uri="{FF2B5EF4-FFF2-40B4-BE49-F238E27FC236}">
+                <a16:creationId xmlns:a16="http://schemas.microsoft.com/office/drawing/2014/main" id="{DB68FD0E-2FCF-4BD5-85F6-8DF931F0B86A}"/>
+              </a:ext>
+            </a:extLst>
+          </p:cNvPr>
+          <p:cNvSpPr>
+            <a:spLocks noGrp="1"/>
+          </p:cNvSpPr>
+          <p:nvPr>
+            <p:ph idx="1"/>
+          </p:nvPr>
+        </p:nvSpPr>
+        <p:spPr>
+          <a:xfrm>
+            <a:off x="1066800" y="2103120"/>
+            <a:ext cx="5029200" cy="3849624"/>
+          </a:xfrm>
+        </p:spPr>
+        <p:txBody>
+          <a:bodyPr>
+            <a:normAutofit/>
+          </a:bodyPr>
+          <a:lstStyle/>
+          <a:p>
+            <a:pPr algn="l"/>
+            <a:r>
+              <a:rPr lang="pl-PL" b="0" i="0" dirty="0">
+                <a:solidFill>
+                  <a:srgbClr val="171717"/>
+                </a:solidFill>
+                <a:effectLst/>
+                <a:latin typeface="Segoe UI" panose="020B0502040204020203" pitchFamily="34" charset="0"/>
+              </a:rPr>
+              <a:t>Windows Virtual Desktop to usługa wirtualizacji pulpitu i aplikacji, która działa w chmurze. Windows Virtual Desktop na platformie </a:t>
+            </a:r>
+            <a:r>
+              <a:rPr lang="pl-PL" b="0" i="0" dirty="0" err="1">
+                <a:solidFill>
+                  <a:srgbClr val="171717"/>
+                </a:solidFill>
+                <a:effectLst/>
+                <a:latin typeface="Segoe UI" panose="020B0502040204020203" pitchFamily="34" charset="0"/>
+              </a:rPr>
+              <a:t>Azure</a:t>
+            </a:r>
+            <a:r>
+              <a:rPr lang="pl-PL" b="0" i="0" dirty="0">
+                <a:solidFill>
+                  <a:srgbClr val="171717"/>
+                </a:solidFill>
+                <a:effectLst/>
+                <a:latin typeface="Segoe UI" panose="020B0502040204020203" pitchFamily="34" charset="0"/>
+              </a:rPr>
+              <a:t> oferuje:</a:t>
+            </a:r>
+          </a:p>
+          <a:p>
+            <a:pPr lvl="1">
+              <a:buFont typeface="Arial" panose="020B0604020202020204" pitchFamily="34" charset="0"/>
+              <a:buChar char="•"/>
+            </a:pPr>
+            <a:r>
+              <a:rPr lang="pl-PL" b="0" i="0" dirty="0">
+                <a:solidFill>
+                  <a:srgbClr val="171717"/>
+                </a:solidFill>
+                <a:effectLst/>
+                <a:latin typeface="Segoe UI" panose="020B0502040204020203" pitchFamily="34" charset="0"/>
+              </a:rPr>
+              <a:t>Konfigurowanie wdrożenia wielosesyjnego Windows 10, które zapewnia pełną Windows 10 skalowalność</a:t>
+            </a:r>
+          </a:p>
+          <a:p>
+            <a:pPr lvl="1">
+              <a:buFont typeface="Arial" panose="020B0604020202020204" pitchFamily="34" charset="0"/>
+              <a:buChar char="•"/>
+            </a:pPr>
+            <a:r>
+              <a:rPr lang="pl-PL" b="0" i="0" dirty="0">
+                <a:solidFill>
+                  <a:srgbClr val="171717"/>
+                </a:solidFill>
+                <a:effectLst/>
+                <a:latin typeface="Segoe UI" panose="020B0502040204020203" pitchFamily="34" charset="0"/>
+              </a:rPr>
+              <a:t>Wirtualizacja usługi Microsoft 365 </a:t>
+            </a:r>
+            <a:r>
+              <a:rPr lang="pl-PL" b="0" i="0" dirty="0" err="1">
+                <a:solidFill>
+                  <a:srgbClr val="171717"/>
+                </a:solidFill>
+                <a:effectLst/>
+                <a:latin typeface="Segoe UI" panose="020B0502040204020203" pitchFamily="34" charset="0"/>
+              </a:rPr>
+              <a:t>Apps</a:t>
+            </a:r>
+            <a:r>
+              <a:rPr lang="pl-PL" b="0" i="0" dirty="0">
+                <a:solidFill>
+                  <a:srgbClr val="171717"/>
+                </a:solidFill>
+                <a:effectLst/>
+                <a:latin typeface="Segoe UI" panose="020B0502040204020203" pitchFamily="34" charset="0"/>
+              </a:rPr>
+              <a:t> dla przedsiębiorstw i optymalizowanie jej pod kątem uruchamiania w scenariuszach wirtualnych z wieloma użytkownikami</a:t>
+            </a:r>
+          </a:p>
+          <a:p>
+            <a:pPr lvl="1">
+              <a:buFont typeface="Arial" panose="020B0604020202020204" pitchFamily="34" charset="0"/>
+              <a:buChar char="•"/>
+            </a:pPr>
+            <a:r>
+              <a:rPr lang="pl-PL" b="0" i="0" dirty="0">
+                <a:solidFill>
+                  <a:srgbClr val="171717"/>
+                </a:solidFill>
+                <a:effectLst/>
+                <a:latin typeface="Segoe UI" panose="020B0502040204020203" pitchFamily="34" charset="0"/>
+              </a:rPr>
+              <a:t>Udostępnij pulpity wirtualne systemu Windows 7 z bezpłatnymi rozszerzonymi aktualizacjami zabezpieczeń</a:t>
+            </a:r>
+          </a:p>
+          <a:p>
+            <a:pPr lvl="1">
+              <a:buFont typeface="Arial" panose="020B0604020202020204" pitchFamily="34" charset="0"/>
+              <a:buChar char="•"/>
+            </a:pPr>
+            <a:r>
+              <a:rPr lang="pl-PL" b="0" i="0" dirty="0">
+                <a:solidFill>
+                  <a:srgbClr val="171717"/>
+                </a:solidFill>
+                <a:effectLst/>
+                <a:latin typeface="Segoe UI" panose="020B0502040204020203" pitchFamily="34" charset="0"/>
+              </a:rPr>
+              <a:t>Usługi pulpitu zdalnego (RDS) i aplikacje Windows Server na każdym komputerze</a:t>
+            </a:r>
+          </a:p>
+          <a:p>
+            <a:pPr lvl="1">
+              <a:buFont typeface="Arial" panose="020B0604020202020204" pitchFamily="34" charset="0"/>
+              <a:buChar char="•"/>
+            </a:pPr>
+            <a:r>
+              <a:rPr lang="pl-PL" b="0" i="0" dirty="0">
+                <a:solidFill>
+                  <a:srgbClr val="171717"/>
+                </a:solidFill>
+                <a:effectLst/>
+                <a:latin typeface="Segoe UI" panose="020B0502040204020203" pitchFamily="34" charset="0"/>
+              </a:rPr>
+              <a:t>Wirtualizacja komputerów stacjonarnych i aplikacji</a:t>
+            </a:r>
+          </a:p>
+          <a:p>
+            <a:pPr lvl="1">
+              <a:buFont typeface="Arial" panose="020B0604020202020204" pitchFamily="34" charset="0"/>
+              <a:buChar char="•"/>
+            </a:pPr>
+            <a:r>
+              <a:rPr lang="pl-PL" b="0" i="0" dirty="0">
+                <a:solidFill>
+                  <a:srgbClr val="171717"/>
+                </a:solidFill>
+                <a:effectLst/>
+                <a:latin typeface="Segoe UI" panose="020B0502040204020203" pitchFamily="34" charset="0"/>
+              </a:rPr>
+              <a:t>Zarządzanie Windows 10, </a:t>
+            </a:r>
+            <a:r>
+              <a:rPr lang="pl-PL" b="0" i="0" dirty="0" err="1">
+                <a:solidFill>
+                  <a:srgbClr val="171717"/>
+                </a:solidFill>
+                <a:effectLst/>
+                <a:latin typeface="Segoe UI" panose="020B0502040204020203" pitchFamily="34" charset="0"/>
+              </a:rPr>
+              <a:t>windows</a:t>
+            </a:r>
+            <a:r>
+              <a:rPr lang="pl-PL" b="0" i="0" dirty="0">
+                <a:solidFill>
+                  <a:srgbClr val="171717"/>
+                </a:solidFill>
+                <a:effectLst/>
+                <a:latin typeface="Segoe UI" panose="020B0502040204020203" pitchFamily="34" charset="0"/>
+              </a:rPr>
+              <a:t> Server oraz aplikacjami i pulpitami systemu Windows 7 za pomocą ujednoliconego zarządzania</a:t>
+            </a:r>
+          </a:p>
+          <a:p>
+            <a:endParaRPr lang="pl-PL" dirty="0"/>
+          </a:p>
+        </p:txBody>
+      </p:sp>
+      <p:pic>
+        <p:nvPicPr>
+          <p:cNvPr id="1026" name="Picture 2" descr="Cennik usługi Windows Virtual Desktop | Microsoft Azure">
+            <a:extLst>
+              <a:ext uri="{FF2B5EF4-FFF2-40B4-BE49-F238E27FC236}">
+                <a16:creationId xmlns:a16="http://schemas.microsoft.com/office/drawing/2014/main" id="{3E1B362E-7382-4A3A-B9CF-75BB8F897AF1}"/>
+              </a:ext>
+            </a:extLst>
+          </p:cNvPr>
+          <p:cNvPicPr>
+            <a:picLocks noChangeAspect="1" noChangeArrowheads="1"/>
+          </p:cNvPicPr>
+          <p:nvPr/>
+        </p:nvPicPr>
+        <p:blipFill>
+          <a:blip r:embed="rId2">
+            <a:extLst>
+              <a:ext uri="{28A0092B-C50C-407E-A947-70E740481C1C}">
+                <a14:useLocalDpi xmlns:a14="http://schemas.microsoft.com/office/drawing/2010/main" val="0"/>
+              </a:ext>
+            </a:extLst>
+          </a:blip>
+          <a:srcRect/>
+          <a:stretch>
+            <a:fillRect/>
+          </a:stretch>
+        </p:blipFill>
+        <p:spPr bwMode="auto">
+          <a:xfrm>
+            <a:off x="6096000" y="2264372"/>
+            <a:ext cx="5715000" cy="3000375"/>
+          </a:xfrm>
+          <a:prstGeom prst="rect">
+            <a:avLst/>
+          </a:prstGeom>
+          <a:noFill/>
+          <a:extLst>
+            <a:ext uri="{909E8E84-426E-40DD-AFC4-6F175D3DCCD1}">
+              <a14:hiddenFill xmlns:a14="http://schemas.microsoft.com/office/drawing/2010/main">
+                <a:solidFill>
+                  <a:srgbClr val="FFFFFF"/>
+                </a:solidFill>
+              </a14:hiddenFill>
+            </a:ext>
+          </a:extLst>
+        </p:spPr>
+      </p:pic>
+    </p:spTree>
+    <p:extLst>
+      <p:ext uri="{BB962C8B-B14F-4D97-AF65-F5344CB8AC3E}">
+        <p14:creationId xmlns:p14="http://schemas.microsoft.com/office/powerpoint/2010/main" val="2644860291"/>
+      </p:ext>
+    </p:extLst>
+  </p:cSld>
+  <p:clrMapOvr>
+    <a:masterClrMapping/>
+  </p:clrMapOvr>
+</p:sld>
+</file>
+
+<file path=ppt/slides/slide12.xml><?xml version="1.0" encoding="utf-8"?>
+<p:sld xmlns:a="http://schemas.openxmlformats.org/drawingml/2006/main" xmlns:r="http://schemas.openxmlformats.org/officeDocument/2006/relationships" xmlns:p="http://schemas.openxmlformats.org/presentationml/2006/main">
+  <p:cSld>
+    <p:spTree>
+      <p:nvGrpSpPr>
+        <p:cNvPr id="1" name=""/>
+        <p:cNvGrpSpPr/>
+        <p:nvPr/>
+      </p:nvGrpSpPr>
+      <p:grpSpPr>
+        <a:xfrm>
+          <a:off x="0" y="0"/>
+          <a:ext cx="0" cy="0"/>
+          <a:chOff x="0" y="0"/>
+          <a:chExt cx="0" cy="0"/>
+        </a:xfrm>
+      </p:grpSpPr>
+      <p:sp>
+        <p:nvSpPr>
+          <p:cNvPr id="2" name="Title 1">
+            <a:extLst>
+              <a:ext uri="{FF2B5EF4-FFF2-40B4-BE49-F238E27FC236}">
                 <a16:creationId xmlns:a16="http://schemas.microsoft.com/office/drawing/2014/main" id="{81BC19B7-A60C-47BC-8530-E9C0E6A9AAFE}"/>
               </a:ext>
             </a:extLst>
@@ -7491,7 +7798,7 @@
 </p:sld>
 </file>
 
-<file path=ppt/slides/slide12.xml><?xml version="1.0" encoding="utf-8"?>
+<file path=ppt/slides/slide13.xml><?xml version="1.0" encoding="utf-8"?>
 <p:sld xmlns:a="http://schemas.openxmlformats.org/drawingml/2006/main" xmlns:r="http://schemas.openxmlformats.org/officeDocument/2006/relationships" xmlns:p="http://schemas.openxmlformats.org/presentationml/2006/main">
   <p:cSld>
     <p:spTree>
@@ -7725,7 +8032,7 @@
 </p:sld>
 </file>
 
-<file path=ppt/slides/slide13.xml><?xml version="1.0" encoding="utf-8"?>
+<file path=ppt/slides/slide14.xml><?xml version="1.0" encoding="utf-8"?>
 <p:sld xmlns:a="http://schemas.openxmlformats.org/drawingml/2006/main" xmlns:r="http://schemas.openxmlformats.org/officeDocument/2006/relationships" xmlns:p="http://schemas.openxmlformats.org/presentationml/2006/main">
   <p:cSld>
     <p:spTree>
@@ -7874,7 +8181,7 @@
 </p:sld>
 </file>
 
-<file path=ppt/slides/slide14.xml><?xml version="1.0" encoding="utf-8"?>
+<file path=ppt/slides/slide15.xml><?xml version="1.0" encoding="utf-8"?>
 <p:sld xmlns:a="http://schemas.openxmlformats.org/drawingml/2006/main" xmlns:r="http://schemas.openxmlformats.org/officeDocument/2006/relationships" xmlns:p="http://schemas.openxmlformats.org/presentationml/2006/main">
   <p:cSld>
     <p:spTree>
@@ -8197,7 +8504,7 @@
 </p:sld>
 </file>
 
-<file path=ppt/slides/slide15.xml><?xml version="1.0" encoding="utf-8"?>
+<file path=ppt/slides/slide16.xml><?xml version="1.0" encoding="utf-8"?>
 <p:sld xmlns:a="http://schemas.openxmlformats.org/drawingml/2006/main" xmlns:r="http://schemas.openxmlformats.org/officeDocument/2006/relationships" xmlns:p="http://schemas.openxmlformats.org/presentationml/2006/main">
   <p:cSld>
     <p:spTree>
@@ -8305,7 +8612,7 @@
 </p:sld>
 </file>
 
-<file path=ppt/slides/slide16.xml><?xml version="1.0" encoding="utf-8"?>
+<file path=ppt/slides/slide17.xml><?xml version="1.0" encoding="utf-8"?>
 <p:sld xmlns:a="http://schemas.openxmlformats.org/drawingml/2006/main" xmlns:r="http://schemas.openxmlformats.org/officeDocument/2006/relationships" xmlns:p="http://schemas.openxmlformats.org/presentationml/2006/main">
   <p:cSld>
     <p:spTree>
@@ -8413,7 +8720,7 @@
 </p:sld>
 </file>
 
-<file path=ppt/slides/slide17.xml><?xml version="1.0" encoding="utf-8"?>
+<file path=ppt/slides/slide18.xml><?xml version="1.0" encoding="utf-8"?>
 <p:sld xmlns:a="http://schemas.openxmlformats.org/drawingml/2006/main" xmlns:r="http://schemas.openxmlformats.org/officeDocument/2006/relationships" xmlns:p="http://schemas.openxmlformats.org/presentationml/2006/main">
   <p:cSld>
     <p:spTree>
@@ -8500,7 +8807,7 @@
 </p:sld>
 </file>
 
-<file path=ppt/slides/slide18.xml><?xml version="1.0" encoding="utf-8"?>
+<file path=ppt/slides/slide19.xml><?xml version="1.0" encoding="utf-8"?>
 <p:sld xmlns:a="http://schemas.openxmlformats.org/drawingml/2006/main" xmlns:r="http://schemas.openxmlformats.org/officeDocument/2006/relationships" xmlns:p="http://schemas.openxmlformats.org/presentationml/2006/main">
   <p:cSld>
     <p:spTree>
@@ -8779,150 +9086,6 @@
 </p:sld>
 </file>
 
-<file path=ppt/slides/slide19.xml><?xml version="1.0" encoding="utf-8"?>
-<p:sld xmlns:a="http://schemas.openxmlformats.org/drawingml/2006/main" xmlns:r="http://schemas.openxmlformats.org/officeDocument/2006/relationships" xmlns:p="http://schemas.openxmlformats.org/presentationml/2006/main">
-  <p:cSld>
-    <p:spTree>
-      <p:nvGrpSpPr>
-        <p:cNvPr id="1" name=""/>
-        <p:cNvGrpSpPr/>
-        <p:nvPr/>
-      </p:nvGrpSpPr>
-      <p:grpSpPr>
-        <a:xfrm>
-          <a:off x="0" y="0"/>
-          <a:ext cx="0" cy="0"/>
-          <a:chOff x="0" y="0"/>
-          <a:chExt cx="0" cy="0"/>
-        </a:xfrm>
-      </p:grpSpPr>
-      <p:sp>
-        <p:nvSpPr>
-          <p:cNvPr id="2" name="Title 1">
-            <a:extLst>
-              <a:ext uri="{FF2B5EF4-FFF2-40B4-BE49-F238E27FC236}">
-                <a16:creationId xmlns:a16="http://schemas.microsoft.com/office/drawing/2014/main" id="{C41595FF-2057-46FF-82A7-0BED827CED21}"/>
-              </a:ext>
-            </a:extLst>
-          </p:cNvPr>
-          <p:cNvSpPr>
-            <a:spLocks noGrp="1"/>
-          </p:cNvSpPr>
-          <p:nvPr>
-            <p:ph type="title"/>
-          </p:nvPr>
-        </p:nvSpPr>
-        <p:spPr/>
-        <p:txBody>
-          <a:bodyPr/>
-          <a:lstStyle/>
-          <a:p>
-            <a:r>
-              <a:rPr lang="pl-PL" dirty="0" err="1"/>
-              <a:t>IoT</a:t>
-            </a:r>
-            <a:endParaRPr lang="pl-PL" dirty="0"/>
-          </a:p>
-        </p:txBody>
-      </p:sp>
-      <p:sp>
-        <p:nvSpPr>
-          <p:cNvPr id="3" name="Content Placeholder 2">
-            <a:extLst>
-              <a:ext uri="{FF2B5EF4-FFF2-40B4-BE49-F238E27FC236}">
-                <a16:creationId xmlns:a16="http://schemas.microsoft.com/office/drawing/2014/main" id="{05C1B56A-7570-41C3-816F-51137B4FED8A}"/>
-              </a:ext>
-            </a:extLst>
-          </p:cNvPr>
-          <p:cNvSpPr>
-            <a:spLocks noGrp="1"/>
-          </p:cNvSpPr>
-          <p:nvPr>
-            <p:ph idx="1"/>
-          </p:nvPr>
-        </p:nvSpPr>
-        <p:spPr>
-          <a:xfrm>
-            <a:off x="1066800" y="3000652"/>
-            <a:ext cx="5766641" cy="2519673"/>
-          </a:xfrm>
-        </p:spPr>
-        <p:txBody>
-          <a:bodyPr>
-            <a:normAutofit/>
-          </a:bodyPr>
-          <a:lstStyle/>
-          <a:p>
-            <a:pPr marL="0" indent="0" algn="l">
-              <a:buNone/>
-            </a:pPr>
-            <a:r>
-              <a:rPr lang="pl-PL" b="0" i="0" dirty="0" err="1">
-                <a:solidFill>
-                  <a:srgbClr val="171717"/>
-                </a:solidFill>
-                <a:effectLst/>
-              </a:rPr>
-              <a:t>IoT</a:t>
-            </a:r>
-            <a:r>
-              <a:rPr lang="pl-PL" b="0" i="0" dirty="0">
-                <a:solidFill>
-                  <a:srgbClr val="171717"/>
-                </a:solidFill>
-                <a:effectLst/>
-              </a:rPr>
-              <a:t> umożliwia urządzeniom gromadzenie informacji, a następnie przekazywanie ich do analizy. Urządzenia inteligentne są wyposażone w czujniki, które zbierają dane.</a:t>
-            </a:r>
-          </a:p>
-          <a:p>
-            <a:endParaRPr lang="pl-PL" dirty="0"/>
-          </a:p>
-        </p:txBody>
-      </p:sp>
-      <p:pic>
-        <p:nvPicPr>
-          <p:cNvPr id="5" name="Picture 4">
-            <a:extLst>
-              <a:ext uri="{FF2B5EF4-FFF2-40B4-BE49-F238E27FC236}">
-                <a16:creationId xmlns:a16="http://schemas.microsoft.com/office/drawing/2014/main" id="{475D5D8D-46F0-4809-BE59-CF50301DB9E8}"/>
-              </a:ext>
-            </a:extLst>
-          </p:cNvPr>
-          <p:cNvPicPr>
-            <a:picLocks noChangeAspect="1"/>
-          </p:cNvPicPr>
-          <p:nvPr/>
-        </p:nvPicPr>
-        <p:blipFill>
-          <a:blip r:embed="rId3"/>
-          <a:stretch>
-            <a:fillRect/>
-          </a:stretch>
-        </p:blipFill>
-        <p:spPr>
-          <a:xfrm>
-            <a:off x="7104371" y="1637129"/>
-            <a:ext cx="4020829" cy="3883196"/>
-          </a:xfrm>
-          <a:prstGeom prst="rect">
-            <a:avLst/>
-          </a:prstGeom>
-        </p:spPr>
-      </p:pic>
-    </p:spTree>
-    <p:extLst>
-      <p:ext uri="{BB962C8B-B14F-4D97-AF65-F5344CB8AC3E}">
-        <p14:creationId xmlns:p14="http://schemas.microsoft.com/office/powerpoint/2010/main" val="181061942"/>
-      </p:ext>
-    </p:extLst>
-  </p:cSld>
-  <p:clrMapOvr>
-    <a:masterClrMapping/>
-  </p:clrMapOvr>
-</p:sld>
-</file>
-
 <file path=ppt/slides/slide2.xml><?xml version="1.0" encoding="utf-8"?>
 <p:sld xmlns:a="http://schemas.openxmlformats.org/drawingml/2006/main" xmlns:r="http://schemas.openxmlformats.org/officeDocument/2006/relationships" xmlns:p="http://schemas.openxmlformats.org/presentationml/2006/main">
   <p:cSld>
@@ -9029,6 +9192,150 @@
           <p:cNvPr id="2" name="Title 1">
             <a:extLst>
               <a:ext uri="{FF2B5EF4-FFF2-40B4-BE49-F238E27FC236}">
+                <a16:creationId xmlns:a16="http://schemas.microsoft.com/office/drawing/2014/main" id="{C41595FF-2057-46FF-82A7-0BED827CED21}"/>
+              </a:ext>
+            </a:extLst>
+          </p:cNvPr>
+          <p:cNvSpPr>
+            <a:spLocks noGrp="1"/>
+          </p:cNvSpPr>
+          <p:nvPr>
+            <p:ph type="title"/>
+          </p:nvPr>
+        </p:nvSpPr>
+        <p:spPr/>
+        <p:txBody>
+          <a:bodyPr/>
+          <a:lstStyle/>
+          <a:p>
+            <a:r>
+              <a:rPr lang="pl-PL" dirty="0" err="1"/>
+              <a:t>IoT</a:t>
+            </a:r>
+            <a:endParaRPr lang="pl-PL" dirty="0"/>
+          </a:p>
+        </p:txBody>
+      </p:sp>
+      <p:sp>
+        <p:nvSpPr>
+          <p:cNvPr id="3" name="Content Placeholder 2">
+            <a:extLst>
+              <a:ext uri="{FF2B5EF4-FFF2-40B4-BE49-F238E27FC236}">
+                <a16:creationId xmlns:a16="http://schemas.microsoft.com/office/drawing/2014/main" id="{05C1B56A-7570-41C3-816F-51137B4FED8A}"/>
+              </a:ext>
+            </a:extLst>
+          </p:cNvPr>
+          <p:cNvSpPr>
+            <a:spLocks noGrp="1"/>
+          </p:cNvSpPr>
+          <p:nvPr>
+            <p:ph idx="1"/>
+          </p:nvPr>
+        </p:nvSpPr>
+        <p:spPr>
+          <a:xfrm>
+            <a:off x="1066800" y="3000652"/>
+            <a:ext cx="5766641" cy="2519673"/>
+          </a:xfrm>
+        </p:spPr>
+        <p:txBody>
+          <a:bodyPr>
+            <a:normAutofit/>
+          </a:bodyPr>
+          <a:lstStyle/>
+          <a:p>
+            <a:pPr marL="0" indent="0" algn="l">
+              <a:buNone/>
+            </a:pPr>
+            <a:r>
+              <a:rPr lang="pl-PL" b="0" i="0" dirty="0" err="1">
+                <a:solidFill>
+                  <a:srgbClr val="171717"/>
+                </a:solidFill>
+                <a:effectLst/>
+              </a:rPr>
+              <a:t>IoT</a:t>
+            </a:r>
+            <a:r>
+              <a:rPr lang="pl-PL" b="0" i="0" dirty="0">
+                <a:solidFill>
+                  <a:srgbClr val="171717"/>
+                </a:solidFill>
+                <a:effectLst/>
+              </a:rPr>
+              <a:t> umożliwia urządzeniom gromadzenie informacji, a następnie przekazywanie ich do analizy. Urządzenia inteligentne są wyposażone w czujniki, które zbierają dane.</a:t>
+            </a:r>
+          </a:p>
+          <a:p>
+            <a:endParaRPr lang="pl-PL" dirty="0"/>
+          </a:p>
+        </p:txBody>
+      </p:sp>
+      <p:pic>
+        <p:nvPicPr>
+          <p:cNvPr id="5" name="Picture 4">
+            <a:extLst>
+              <a:ext uri="{FF2B5EF4-FFF2-40B4-BE49-F238E27FC236}">
+                <a16:creationId xmlns:a16="http://schemas.microsoft.com/office/drawing/2014/main" id="{475D5D8D-46F0-4809-BE59-CF50301DB9E8}"/>
+              </a:ext>
+            </a:extLst>
+          </p:cNvPr>
+          <p:cNvPicPr>
+            <a:picLocks noChangeAspect="1"/>
+          </p:cNvPicPr>
+          <p:nvPr/>
+        </p:nvPicPr>
+        <p:blipFill>
+          <a:blip r:embed="rId3"/>
+          <a:stretch>
+            <a:fillRect/>
+          </a:stretch>
+        </p:blipFill>
+        <p:spPr>
+          <a:xfrm>
+            <a:off x="7104371" y="1637129"/>
+            <a:ext cx="4020829" cy="3883196"/>
+          </a:xfrm>
+          <a:prstGeom prst="rect">
+            <a:avLst/>
+          </a:prstGeom>
+        </p:spPr>
+      </p:pic>
+    </p:spTree>
+    <p:extLst>
+      <p:ext uri="{BB962C8B-B14F-4D97-AF65-F5344CB8AC3E}">
+        <p14:creationId xmlns:p14="http://schemas.microsoft.com/office/powerpoint/2010/main" val="181061942"/>
+      </p:ext>
+    </p:extLst>
+  </p:cSld>
+  <p:clrMapOvr>
+    <a:masterClrMapping/>
+  </p:clrMapOvr>
+</p:sld>
+</file>
+
+<file path=ppt/slides/slide21.xml><?xml version="1.0" encoding="utf-8"?>
+<p:sld xmlns:a="http://schemas.openxmlformats.org/drawingml/2006/main" xmlns:r="http://schemas.openxmlformats.org/officeDocument/2006/relationships" xmlns:p="http://schemas.openxmlformats.org/presentationml/2006/main">
+  <p:cSld>
+    <p:spTree>
+      <p:nvGrpSpPr>
+        <p:cNvPr id="1" name=""/>
+        <p:cNvGrpSpPr/>
+        <p:nvPr/>
+      </p:nvGrpSpPr>
+      <p:grpSpPr>
+        <a:xfrm>
+          <a:off x="0" y="0"/>
+          <a:ext cx="0" cy="0"/>
+          <a:chOff x="0" y="0"/>
+          <a:chExt cx="0" cy="0"/>
+        </a:xfrm>
+      </p:grpSpPr>
+      <p:sp>
+        <p:nvSpPr>
+          <p:cNvPr id="2" name="Title 1">
+            <a:extLst>
+              <a:ext uri="{FF2B5EF4-FFF2-40B4-BE49-F238E27FC236}">
                 <a16:creationId xmlns:a16="http://schemas.microsoft.com/office/drawing/2014/main" id="{D9D1AC80-1F6C-4EF2-AD1E-A8E6DA0FFC1B}"/>
               </a:ext>
             </a:extLst>
@@ -9167,7 +9474,7 @@
 </p:sld>
 </file>
 
-<file path=ppt/slides/slide21.xml><?xml version="1.0" encoding="utf-8"?>
+<file path=ppt/slides/slide22.xml><?xml version="1.0" encoding="utf-8"?>
 <p:sld xmlns:a="http://schemas.openxmlformats.org/drawingml/2006/main" xmlns:r="http://schemas.openxmlformats.org/officeDocument/2006/relationships" xmlns:p="http://schemas.openxmlformats.org/presentationml/2006/main">
   <p:cSld>
     <p:spTree>
@@ -9377,7 +9684,7 @@
 </p:sld>
 </file>
 
-<file path=ppt/slides/slide22.xml><?xml version="1.0" encoding="utf-8"?>
+<file path=ppt/slides/slide23.xml><?xml version="1.0" encoding="utf-8"?>
 <p:sld xmlns:a="http://schemas.openxmlformats.org/drawingml/2006/main" xmlns:r="http://schemas.openxmlformats.org/officeDocument/2006/relationships" xmlns:p="http://schemas.openxmlformats.org/presentationml/2006/main">
   <p:cSld>
     <p:spTree>
@@ -9637,7 +9944,7 @@
 </p:sld>
 </file>
 
-<file path=ppt/slides/slide23.xml><?xml version="1.0" encoding="utf-8"?>
+<file path=ppt/slides/slide24.xml><?xml version="1.0" encoding="utf-8"?>
 <p:sld xmlns:a="http://schemas.openxmlformats.org/drawingml/2006/main" xmlns:r="http://schemas.openxmlformats.org/officeDocument/2006/relationships" xmlns:p="http://schemas.openxmlformats.org/presentationml/2006/main">
   <p:cSld>
     <p:spTree>
@@ -9875,7 +10182,7 @@
 </p:sld>
 </file>
 
-<file path=ppt/slides/slide24.xml><?xml version="1.0" encoding="utf-8"?>
+<file path=ppt/slides/slide25.xml><?xml version="1.0" encoding="utf-8"?>
 <p:sld xmlns:a="http://schemas.openxmlformats.org/drawingml/2006/main" xmlns:r="http://schemas.openxmlformats.org/officeDocument/2006/relationships" xmlns:p="http://schemas.openxmlformats.org/presentationml/2006/main">
   <p:cSld>
     <p:spTree>
@@ -10226,7 +10533,7 @@
 </p:sld>
 </file>
 
-<file path=ppt/slides/slide25.xml><?xml version="1.0" encoding="utf-8"?>
+<file path=ppt/slides/slide26.xml><?xml version="1.0" encoding="utf-8"?>
 <p:sld xmlns:a="http://schemas.openxmlformats.org/drawingml/2006/main" xmlns:r="http://schemas.openxmlformats.org/officeDocument/2006/relationships" xmlns:p="http://schemas.openxmlformats.org/presentationml/2006/main">
   <p:cSld>
     <p:spTree>
@@ -10526,7 +10833,7 @@
 </p:sld>
 </file>
 
-<file path=ppt/slides/slide26.xml><?xml version="1.0" encoding="utf-8"?>
+<file path=ppt/slides/slide27.xml><?xml version="1.0" encoding="utf-8"?>
 <p:sld xmlns:a="http://schemas.openxmlformats.org/drawingml/2006/main" xmlns:r="http://schemas.openxmlformats.org/officeDocument/2006/relationships" xmlns:p="http://schemas.openxmlformats.org/presentationml/2006/main">
   <p:cSld>
     <p:spTree>
@@ -10674,7 +10981,7 @@
 </p:sld>
 </file>
 
-<file path=ppt/slides/slide27.xml><?xml version="1.0" encoding="utf-8"?>
+<file path=ppt/slides/slide28.xml><?xml version="1.0" encoding="utf-8"?>
 <p:sld xmlns:a="http://schemas.openxmlformats.org/drawingml/2006/main" xmlns:r="http://schemas.openxmlformats.org/officeDocument/2006/relationships" xmlns:p="http://schemas.openxmlformats.org/presentationml/2006/main">
   <p:cSld>
     <p:spTree>
@@ -10875,7 +11182,7 @@
 </p:sld>
 </file>
 
-<file path=ppt/slides/slide28.xml><?xml version="1.0" encoding="utf-8"?>
+<file path=ppt/slides/slide29.xml><?xml version="1.0" encoding="utf-8"?>
 <p:sld xmlns:a="http://schemas.openxmlformats.org/drawingml/2006/main" xmlns:r="http://schemas.openxmlformats.org/officeDocument/2006/relationships" xmlns:p="http://schemas.openxmlformats.org/presentationml/2006/main">
   <p:cSld>
     <p:spTree>
@@ -11046,171 +11353,6 @@
     <p:extLst>
       <p:ext uri="{BB962C8B-B14F-4D97-AF65-F5344CB8AC3E}">
         <p14:creationId xmlns:p14="http://schemas.microsoft.com/office/powerpoint/2010/main" val="281087705"/>
-      </p:ext>
-    </p:extLst>
-  </p:cSld>
-  <p:clrMapOvr>
-    <a:masterClrMapping/>
-  </p:clrMapOvr>
-</p:sld>
-</file>
-
-<file path=ppt/slides/slide29.xml><?xml version="1.0" encoding="utf-8"?>
-<p:sld xmlns:a="http://schemas.openxmlformats.org/drawingml/2006/main" xmlns:r="http://schemas.openxmlformats.org/officeDocument/2006/relationships" xmlns:p="http://schemas.openxmlformats.org/presentationml/2006/main">
-  <p:cSld>
-    <p:spTree>
-      <p:nvGrpSpPr>
-        <p:cNvPr id="1" name=""/>
-        <p:cNvGrpSpPr/>
-        <p:nvPr/>
-      </p:nvGrpSpPr>
-      <p:grpSpPr>
-        <a:xfrm>
-          <a:off x="0" y="0"/>
-          <a:ext cx="0" cy="0"/>
-          <a:chOff x="0" y="0"/>
-          <a:chExt cx="0" cy="0"/>
-        </a:xfrm>
-      </p:grpSpPr>
-      <p:sp>
-        <p:nvSpPr>
-          <p:cNvPr id="2" name="Title 1">
-            <a:extLst>
-              <a:ext uri="{FF2B5EF4-FFF2-40B4-BE49-F238E27FC236}">
-                <a16:creationId xmlns:a16="http://schemas.microsoft.com/office/drawing/2014/main" id="{3D22D1EA-7507-45BE-870A-9C67EA532432}"/>
-              </a:ext>
-            </a:extLst>
-          </p:cNvPr>
-          <p:cNvSpPr>
-            <a:spLocks noGrp="1"/>
-          </p:cNvSpPr>
-          <p:nvPr>
-            <p:ph type="title"/>
-          </p:nvPr>
-        </p:nvSpPr>
-        <p:spPr/>
-        <p:txBody>
-          <a:bodyPr/>
-          <a:lstStyle/>
-          <a:p>
-            <a:r>
-              <a:rPr lang="en-US" dirty="0"/>
-              <a:t>Azure </a:t>
-            </a:r>
-            <a:r>
-              <a:rPr lang="pl-PL" dirty="0"/>
-              <a:t>Bot Service</a:t>
-            </a:r>
-          </a:p>
-        </p:txBody>
-      </p:sp>
-      <p:sp>
-        <p:nvSpPr>
-          <p:cNvPr id="3" name="Content Placeholder 2">
-            <a:extLst>
-              <a:ext uri="{FF2B5EF4-FFF2-40B4-BE49-F238E27FC236}">
-                <a16:creationId xmlns:a16="http://schemas.microsoft.com/office/drawing/2014/main" id="{6D266F9A-DB5C-468D-8496-11E2E9ED8C5A}"/>
-              </a:ext>
-            </a:extLst>
-          </p:cNvPr>
-          <p:cNvSpPr>
-            <a:spLocks noGrp="1"/>
-          </p:cNvSpPr>
-          <p:nvPr>
-            <p:ph idx="1"/>
-          </p:nvPr>
-        </p:nvSpPr>
-        <p:spPr>
-          <a:xfrm>
-            <a:off x="1066800" y="2103120"/>
-            <a:ext cx="5029200" cy="3849624"/>
-          </a:xfrm>
-        </p:spPr>
-        <p:txBody>
-          <a:bodyPr/>
-          <a:lstStyle/>
-          <a:p>
-            <a:r>
-              <a:rPr lang="pl-PL" dirty="0" err="1"/>
-              <a:t>Azure</a:t>
-            </a:r>
-            <a:r>
-              <a:rPr lang="pl-PL" dirty="0"/>
-              <a:t> Bot Service i Bot </a:t>
-            </a:r>
-            <a:r>
-              <a:rPr lang="pl-PL" dirty="0" err="1"/>
-              <a:t>Frameworks</a:t>
-            </a:r>
-            <a:r>
-              <a:rPr lang="pl-PL" dirty="0"/>
-              <a:t> są platformami do tworzenia agentów, którzy rozumieją i potrafią odpowiadać na zadawane pytania. Pod spodem używają </a:t>
-            </a:r>
-            <a:r>
-              <a:rPr lang="pl-PL" dirty="0" err="1"/>
-              <a:t>Azure</a:t>
-            </a:r>
-            <a:r>
-              <a:rPr lang="pl-PL" dirty="0"/>
-              <a:t> </a:t>
-            </a:r>
-            <a:r>
-              <a:rPr lang="pl-PL" dirty="0" err="1"/>
-              <a:t>Cognitive</a:t>
-            </a:r>
-            <a:r>
-              <a:rPr lang="pl-PL" dirty="0"/>
-              <a:t> Services, aby zrozumieć czego oczekują od nich użytkownicy.</a:t>
-            </a:r>
-          </a:p>
-          <a:p>
-            <a:r>
-              <a:rPr lang="pl-PL" dirty="0"/>
-              <a:t>Można się z nimi komunikować tekstu, interaktywnych kart oraz mowy</a:t>
-            </a:r>
-          </a:p>
-        </p:txBody>
-      </p:sp>
-      <p:pic>
-        <p:nvPicPr>
-          <p:cNvPr id="5" name="Graphic 4">
-            <a:extLst>
-              <a:ext uri="{FF2B5EF4-FFF2-40B4-BE49-F238E27FC236}">
-                <a16:creationId xmlns:a16="http://schemas.microsoft.com/office/drawing/2014/main" id="{AF3AB0B2-5A9A-4B45-BCBC-DFF012E6A7A0}"/>
-              </a:ext>
-            </a:extLst>
-          </p:cNvPr>
-          <p:cNvPicPr>
-            <a:picLocks noChangeAspect="1"/>
-          </p:cNvPicPr>
-          <p:nvPr/>
-        </p:nvPicPr>
-        <p:blipFill>
-          <a:blip r:embed="rId2">
-            <a:extLst>
-              <a:ext uri="{96DAC541-7B7A-43D3-8B79-37D633B846F1}">
-                <asvg:svgBlip xmlns:asvg="http://schemas.microsoft.com/office/drawing/2016/SVG/main" r:embed="rId3"/>
-              </a:ext>
-            </a:extLst>
-          </a:blip>
-          <a:stretch>
-            <a:fillRect/>
-          </a:stretch>
-        </p:blipFill>
-        <p:spPr>
-          <a:xfrm>
-            <a:off x="7065236" y="1892468"/>
-            <a:ext cx="3073063" cy="3073063"/>
-          </a:xfrm>
-          <a:prstGeom prst="rect">
-            <a:avLst/>
-          </a:prstGeom>
-        </p:spPr>
-      </p:pic>
-    </p:spTree>
-    <p:extLst>
-      <p:ext uri="{BB962C8B-B14F-4D97-AF65-F5344CB8AC3E}">
-        <p14:creationId xmlns:p14="http://schemas.microsoft.com/office/powerpoint/2010/main" val="728789638"/>
       </p:ext>
     </p:extLst>
   </p:cSld>
@@ -11583,6 +11725,171 @@
           <p:cNvPr id="2" name="Title 1">
             <a:extLst>
               <a:ext uri="{FF2B5EF4-FFF2-40B4-BE49-F238E27FC236}">
+                <a16:creationId xmlns:a16="http://schemas.microsoft.com/office/drawing/2014/main" id="{3D22D1EA-7507-45BE-870A-9C67EA532432}"/>
+              </a:ext>
+            </a:extLst>
+          </p:cNvPr>
+          <p:cNvSpPr>
+            <a:spLocks noGrp="1"/>
+          </p:cNvSpPr>
+          <p:nvPr>
+            <p:ph type="title"/>
+          </p:nvPr>
+        </p:nvSpPr>
+        <p:spPr/>
+        <p:txBody>
+          <a:bodyPr/>
+          <a:lstStyle/>
+          <a:p>
+            <a:r>
+              <a:rPr lang="en-US" dirty="0"/>
+              <a:t>Azure </a:t>
+            </a:r>
+            <a:r>
+              <a:rPr lang="pl-PL" dirty="0"/>
+              <a:t>Bot Service</a:t>
+            </a:r>
+          </a:p>
+        </p:txBody>
+      </p:sp>
+      <p:sp>
+        <p:nvSpPr>
+          <p:cNvPr id="3" name="Content Placeholder 2">
+            <a:extLst>
+              <a:ext uri="{FF2B5EF4-FFF2-40B4-BE49-F238E27FC236}">
+                <a16:creationId xmlns:a16="http://schemas.microsoft.com/office/drawing/2014/main" id="{6D266F9A-DB5C-468D-8496-11E2E9ED8C5A}"/>
+              </a:ext>
+            </a:extLst>
+          </p:cNvPr>
+          <p:cNvSpPr>
+            <a:spLocks noGrp="1"/>
+          </p:cNvSpPr>
+          <p:nvPr>
+            <p:ph idx="1"/>
+          </p:nvPr>
+        </p:nvSpPr>
+        <p:spPr>
+          <a:xfrm>
+            <a:off x="1066800" y="2103120"/>
+            <a:ext cx="5029200" cy="3849624"/>
+          </a:xfrm>
+        </p:spPr>
+        <p:txBody>
+          <a:bodyPr/>
+          <a:lstStyle/>
+          <a:p>
+            <a:r>
+              <a:rPr lang="pl-PL" dirty="0" err="1"/>
+              <a:t>Azure</a:t>
+            </a:r>
+            <a:r>
+              <a:rPr lang="pl-PL" dirty="0"/>
+              <a:t> Bot Service i Bot </a:t>
+            </a:r>
+            <a:r>
+              <a:rPr lang="pl-PL" dirty="0" err="1"/>
+              <a:t>Frameworks</a:t>
+            </a:r>
+            <a:r>
+              <a:rPr lang="pl-PL" dirty="0"/>
+              <a:t> są platformami do tworzenia agentów, którzy rozumieją i potrafią odpowiadać na zadawane pytania. Pod spodem używają </a:t>
+            </a:r>
+            <a:r>
+              <a:rPr lang="pl-PL" dirty="0" err="1"/>
+              <a:t>Azure</a:t>
+            </a:r>
+            <a:r>
+              <a:rPr lang="pl-PL" dirty="0"/>
+              <a:t> </a:t>
+            </a:r>
+            <a:r>
+              <a:rPr lang="pl-PL" dirty="0" err="1"/>
+              <a:t>Cognitive</a:t>
+            </a:r>
+            <a:r>
+              <a:rPr lang="pl-PL" dirty="0"/>
+              <a:t> Services, aby zrozumieć czego oczekują od nich użytkownicy.</a:t>
+            </a:r>
+          </a:p>
+          <a:p>
+            <a:r>
+              <a:rPr lang="pl-PL" dirty="0"/>
+              <a:t>Można się z nimi komunikować tekstu, interaktywnych kart oraz mowy</a:t>
+            </a:r>
+          </a:p>
+        </p:txBody>
+      </p:sp>
+      <p:pic>
+        <p:nvPicPr>
+          <p:cNvPr id="5" name="Graphic 4">
+            <a:extLst>
+              <a:ext uri="{FF2B5EF4-FFF2-40B4-BE49-F238E27FC236}">
+                <a16:creationId xmlns:a16="http://schemas.microsoft.com/office/drawing/2014/main" id="{AF3AB0B2-5A9A-4B45-BCBC-DFF012E6A7A0}"/>
+              </a:ext>
+            </a:extLst>
+          </p:cNvPr>
+          <p:cNvPicPr>
+            <a:picLocks noChangeAspect="1"/>
+          </p:cNvPicPr>
+          <p:nvPr/>
+        </p:nvPicPr>
+        <p:blipFill>
+          <a:blip r:embed="rId2">
+            <a:extLst>
+              <a:ext uri="{96DAC541-7B7A-43D3-8B79-37D633B846F1}">
+                <asvg:svgBlip xmlns:asvg="http://schemas.microsoft.com/office/drawing/2016/SVG/main" r:embed="rId3"/>
+              </a:ext>
+            </a:extLst>
+          </a:blip>
+          <a:stretch>
+            <a:fillRect/>
+          </a:stretch>
+        </p:blipFill>
+        <p:spPr>
+          <a:xfrm>
+            <a:off x="7065236" y="1892468"/>
+            <a:ext cx="3073063" cy="3073063"/>
+          </a:xfrm>
+          <a:prstGeom prst="rect">
+            <a:avLst/>
+          </a:prstGeom>
+        </p:spPr>
+      </p:pic>
+    </p:spTree>
+    <p:extLst>
+      <p:ext uri="{BB962C8B-B14F-4D97-AF65-F5344CB8AC3E}">
+        <p14:creationId xmlns:p14="http://schemas.microsoft.com/office/powerpoint/2010/main" val="728789638"/>
+      </p:ext>
+    </p:extLst>
+  </p:cSld>
+  <p:clrMapOvr>
+    <a:masterClrMapping/>
+  </p:clrMapOvr>
+</p:sld>
+</file>
+
+<file path=ppt/slides/slide31.xml><?xml version="1.0" encoding="utf-8"?>
+<p:sld xmlns:a="http://schemas.openxmlformats.org/drawingml/2006/main" xmlns:r="http://schemas.openxmlformats.org/officeDocument/2006/relationships" xmlns:p="http://schemas.openxmlformats.org/presentationml/2006/main">
+  <p:cSld>
+    <p:spTree>
+      <p:nvGrpSpPr>
+        <p:cNvPr id="1" name=""/>
+        <p:cNvGrpSpPr/>
+        <p:nvPr/>
+      </p:nvGrpSpPr>
+      <p:grpSpPr>
+        <a:xfrm>
+          <a:off x="0" y="0"/>
+          <a:ext cx="0" cy="0"/>
+          <a:chOff x="0" y="0"/>
+          <a:chExt cx="0" cy="0"/>
+        </a:xfrm>
+      </p:grpSpPr>
+      <p:sp>
+        <p:nvSpPr>
+          <p:cNvPr id="2" name="Title 1">
+            <a:extLst>
+              <a:ext uri="{FF2B5EF4-FFF2-40B4-BE49-F238E27FC236}">
                 <a16:creationId xmlns:a16="http://schemas.microsoft.com/office/drawing/2014/main" id="{81BC19B7-A60C-47BC-8530-E9C0E6A9AAFE}"/>
               </a:ext>
             </a:extLst>
@@ -11645,7 +11952,7 @@
 </p:sld>
 </file>
 
-<file path=ppt/slides/slide31.xml><?xml version="1.0" encoding="utf-8"?>
+<file path=ppt/slides/slide32.xml><?xml version="1.0" encoding="utf-8"?>
 <p:sld xmlns:a="http://schemas.openxmlformats.org/drawingml/2006/main" xmlns:r="http://schemas.openxmlformats.org/officeDocument/2006/relationships" xmlns:p="http://schemas.openxmlformats.org/presentationml/2006/main">
   <p:cSld>
     <p:spTree>
@@ -11878,7 +12185,7 @@
 </p:sld>
 </file>
 
-<file path=ppt/slides/slide32.xml><?xml version="1.0" encoding="utf-8"?>
+<file path=ppt/slides/slide33.xml><?xml version="1.0" encoding="utf-8"?>
 <p:sld xmlns:a="http://schemas.openxmlformats.org/drawingml/2006/main" xmlns:r="http://schemas.openxmlformats.org/officeDocument/2006/relationships" xmlns:p="http://schemas.openxmlformats.org/presentationml/2006/main">
   <p:cSld>
     <p:spTree>
@@ -12226,7 +12533,7 @@
 </p:sld>
 </file>
 
-<file path=ppt/slides/slide33.xml><?xml version="1.0" encoding="utf-8"?>
+<file path=ppt/slides/slide34.xml><?xml version="1.0" encoding="utf-8"?>
 <p:sld xmlns:a="http://schemas.openxmlformats.org/drawingml/2006/main" xmlns:r="http://schemas.openxmlformats.org/officeDocument/2006/relationships" xmlns:p="http://schemas.openxmlformats.org/presentationml/2006/main">
   <p:cSld>
     <p:spTree>
@@ -12470,7 +12777,7 @@
 </p:sld>
 </file>
 
-<file path=ppt/slides/slide34.xml><?xml version="1.0" encoding="utf-8"?>
+<file path=ppt/slides/slide35.xml><?xml version="1.0" encoding="utf-8"?>
 <p:sld xmlns:a="http://schemas.openxmlformats.org/drawingml/2006/main" xmlns:r="http://schemas.openxmlformats.org/officeDocument/2006/relationships" xmlns:p="http://schemas.openxmlformats.org/presentationml/2006/main">
   <p:cSld>
     <p:spTree>
@@ -12941,7 +13248,7 @@
 </p:sld>
 </file>
 
-<file path=ppt/slides/slide35.xml><?xml version="1.0" encoding="utf-8"?>
+<file path=ppt/slides/slide36.xml><?xml version="1.0" encoding="utf-8"?>
 <p:sld xmlns:a="http://schemas.openxmlformats.org/drawingml/2006/main" xmlns:r="http://schemas.openxmlformats.org/officeDocument/2006/relationships" xmlns:p="http://schemas.openxmlformats.org/presentationml/2006/main">
   <p:cSld>
     <p:spTree>
@@ -13277,7 +13584,7 @@
 </p:sld>
 </file>
 
-<file path=ppt/slides/slide36.xml><?xml version="1.0" encoding="utf-8"?>
+<file path=ppt/slides/slide37.xml><?xml version="1.0" encoding="utf-8"?>
 <p:sld xmlns:a="http://schemas.openxmlformats.org/drawingml/2006/main" xmlns:r="http://schemas.openxmlformats.org/officeDocument/2006/relationships" xmlns:p="http://schemas.openxmlformats.org/presentationml/2006/main">
   <p:cSld>
     <p:spTree>
@@ -47705,15 +48012,6 @@
 </file>
 
 <file path=customXml/item1.xml><?xml version="1.0" encoding="utf-8"?>
-<?mso-contentType ?>
-<FormTemplates xmlns="http://schemas.microsoft.com/sharepoint/v3/contenttype/forms">
-  <Display>DocumentLibraryForm</Display>
-  <Edit>DocumentLibraryForm</Edit>
-  <New>DocumentLibraryForm</New>
-</FormTemplates>
-</file>
-
-<file path=customXml/item2.xml><?xml version="1.0" encoding="utf-8"?>
 <ct:contentTypeSchema xmlns:ct="http://schemas.microsoft.com/office/2006/metadata/contentType" xmlns:ma="http://schemas.microsoft.com/office/2006/metadata/properties/metaAttributes" ct:_="" ma:_="" ma:contentTypeName="Document" ma:contentTypeID="0x01010079F111ED35F8CC479449609E8A0923A6" ma:contentTypeVersion="12" ma:contentTypeDescription="Create a new document." ma:contentTypeScope="" ma:versionID="a410dd7f93c95333ffa1b60ed6adedd1">
   <xsd:schema xmlns:xsd="http://www.w3.org/2001/XMLSchema" xmlns:xs="http://www.w3.org/2001/XMLSchema" xmlns:p="http://schemas.microsoft.com/office/2006/metadata/properties" xmlns:ns2="71af3243-3dd4-4a8d-8c0d-dd76da1f02a5" xmlns:ns3="16c05727-aa75-4e4a-9b5f-8a80a1165891" targetNamespace="http://schemas.microsoft.com/office/2006/metadata/properties" ma:root="true" ma:fieldsID="a936d9baba76aa3866493feff160faab" ns2:_="" ns3:_="">
     <xsd:import namespace="71af3243-3dd4-4a8d-8c0d-dd76da1f02a5"/>
@@ -47934,6 +48232,15 @@
 </ct:contentTypeSchema>
 </file>
 
+<file path=customXml/item2.xml><?xml version="1.0" encoding="utf-8"?>
+<?mso-contentType ?>
+<FormTemplates xmlns="http://schemas.microsoft.com/sharepoint/v3/contenttype/forms">
+  <Display>DocumentLibraryForm</Display>
+  <Edit>DocumentLibraryForm</Edit>
+  <New>DocumentLibraryForm</New>
+</FormTemplates>
+</file>
+
 <file path=customXml/item3.xml><?xml version="1.0" encoding="utf-8"?>
 <p:properties xmlns:p="http://schemas.microsoft.com/office/2006/metadata/properties" xmlns:xsi="http://www.w3.org/2001/XMLSchema-instance" xmlns:pc="http://schemas.microsoft.com/office/infopath/2007/PartnerControls">
   <documentManagement>
@@ -47944,14 +48251,6 @@
 </file>
 
 <file path=customXml/itemProps1.xml><?xml version="1.0" encoding="utf-8"?>
-<ds:datastoreItem xmlns:ds="http://schemas.openxmlformats.org/officeDocument/2006/customXml" ds:itemID="{CDB58277-F8DF-46FF-84EC-EF41B835E69F}">
-  <ds:schemaRefs>
-    <ds:schemaRef ds:uri="http://schemas.microsoft.com/sharepoint/v3/contenttype/forms"/>
-  </ds:schemaRefs>
-</ds:datastoreItem>
-</file>
-
-<file path=customXml/itemProps2.xml><?xml version="1.0" encoding="utf-8"?>
 <ds:datastoreItem xmlns:ds="http://schemas.openxmlformats.org/officeDocument/2006/customXml" ds:itemID="{2D276E62-80A3-44DD-9BCC-97ED2B99B57F}">
   <ds:schemaRefs>
     <ds:schemaRef ds:uri="http://schemas.microsoft.com/office/2006/metadata/contentType"/>
@@ -47970,6 +48269,14 @@
 </ds:datastoreItem>
 </file>
 
+<file path=customXml/itemProps2.xml><?xml version="1.0" encoding="utf-8"?>
+<ds:datastoreItem xmlns:ds="http://schemas.openxmlformats.org/officeDocument/2006/customXml" ds:itemID="{CDB58277-F8DF-46FF-84EC-EF41B835E69F}">
+  <ds:schemaRefs>
+    <ds:schemaRef ds:uri="http://schemas.microsoft.com/sharepoint/v3/contenttype/forms"/>
+  </ds:schemaRefs>
+</ds:datastoreItem>
+</file>
+
 <file path=customXml/itemProps3.xml><?xml version="1.0" encoding="utf-8"?>
 <ds:datastoreItem xmlns:ds="http://schemas.openxmlformats.org/officeDocument/2006/customXml" ds:itemID="{137651BA-F45C-4845-9AB3-E0A65B39F5E1}">
   <ds:schemaRefs>

</xml_diff>